<commit_message>
Updated abstract, powerpoint, and spreadsheet
</commit_message>
<xml_diff>
--- a/MILCOM_abstract.pptx
+++ b/MILCOM_abstract.pptx
@@ -109,6 +109,11 @@
       </a:defRPr>
     </a:lvl9pPr>
   </p:defaultTextStyle>
+  <p:extLst>
+    <p:ext uri="{EFAFB233-063F-42B5-8137-9DF3F51BA10A}">
+      <p15:sldGuideLst xmlns:p15="http://schemas.microsoft.com/office/powerpoint/2012/main"/>
+    </p:ext>
+  </p:extLst>
 </p:presentation>
 </file>
 
@@ -372,7 +377,7 @@
                 </a:solidFill>
               </a:rPr>
               <a:pPr/>
-              <a:t>2/3/2016</a:t>
+              <a:t>2/3/16</a:t>
             </a:fld>
             <a:endParaRPr lang="en-US">
               <a:solidFill>
@@ -486,11 +491,6 @@
               </a:rPr>
               <a:t>Institute for Critical Technology and Applied Science</a:t>
             </a:r>
-            <a:endParaRPr lang="en-US" sz="1400" i="1" dirty="0">
-              <a:solidFill>
-                <a:prstClr val="white"/>
-              </a:solidFill>
-            </a:endParaRPr>
           </a:p>
         </p:txBody>
       </p:sp>
@@ -593,11 +593,6 @@
               </a:rPr>
               <a:t>www.hume.vt.edu</a:t>
             </a:r>
-            <a:endParaRPr lang="en-US" dirty="0">
-              <a:solidFill>
-                <a:prstClr val="white"/>
-              </a:solidFill>
-            </a:endParaRPr>
           </a:p>
         </p:txBody>
       </p:sp>
@@ -735,7 +730,7 @@
                 </a:solidFill>
               </a:rPr>
               <a:pPr/>
-              <a:t>2/3/2016</a:t>
+              <a:t>2/3/16</a:t>
             </a:fld>
             <a:endParaRPr lang="en-US">
               <a:solidFill>
@@ -945,7 +940,7 @@
                 </a:solidFill>
               </a:rPr>
               <a:pPr/>
-              <a:t>2/3/2016</a:t>
+              <a:t>2/3/16</a:t>
             </a:fld>
             <a:endParaRPr lang="en-US">
               <a:solidFill>
@@ -1276,7 +1271,7 @@
                 </a:solidFill>
               </a:rPr>
               <a:pPr/>
-              <a:t>2/3/2016</a:t>
+              <a:t>2/3/16</a:t>
             </a:fld>
             <a:endParaRPr lang="en-US">
               <a:solidFill>
@@ -1708,11 +1703,6 @@
               </a:rPr>
               <a:t>Institute for Critical Technology and Applied Science</a:t>
             </a:r>
-            <a:endParaRPr lang="en-US" sz="1400" i="1" dirty="0">
-              <a:solidFill>
-                <a:prstClr val="black"/>
-              </a:solidFill>
-            </a:endParaRPr>
           </a:p>
         </p:txBody>
       </p:sp>
@@ -1952,7 +1942,7 @@
                 </a:solidFill>
               </a:rPr>
               <a:pPr/>
-              <a:t>2/3/2016</a:t>
+              <a:t>2/3/16</a:t>
             </a:fld>
             <a:endParaRPr lang="en-US">
               <a:solidFill>
@@ -2221,7 +2211,7 @@
                 </a:solidFill>
               </a:rPr>
               <a:pPr/>
-              <a:t>2/3/2016</a:t>
+              <a:t>2/3/16</a:t>
             </a:fld>
             <a:endParaRPr lang="en-US">
               <a:solidFill>
@@ -2635,7 +2625,7 @@
                 </a:solidFill>
               </a:rPr>
               <a:pPr/>
-              <a:t>2/3/2016</a:t>
+              <a:t>2/3/16</a:t>
             </a:fld>
             <a:endParaRPr lang="en-US">
               <a:solidFill>
@@ -2790,7 +2780,7 @@
                 </a:solidFill>
               </a:rPr>
               <a:pPr/>
-              <a:t>2/3/2016</a:t>
+              <a:t>2/3/16</a:t>
             </a:fld>
             <a:endParaRPr lang="en-US">
               <a:solidFill>
@@ -2922,7 +2912,7 @@
                 </a:solidFill>
               </a:rPr>
               <a:pPr/>
-              <a:t>2/3/2016</a:t>
+              <a:t>2/3/16</a:t>
             </a:fld>
             <a:endParaRPr lang="en-US">
               <a:solidFill>
@@ -3236,7 +3226,7 @@
                 </a:solidFill>
               </a:rPr>
               <a:pPr/>
-              <a:t>2/3/2016</a:t>
+              <a:t>2/3/16</a:t>
             </a:fld>
             <a:endParaRPr lang="en-US">
               <a:solidFill>
@@ -3519,7 +3509,7 @@
                 </a:solidFill>
               </a:rPr>
               <a:pPr/>
-              <a:t>2/3/2016</a:t>
+              <a:t>2/3/16</a:t>
             </a:fld>
             <a:endParaRPr lang="en-US">
               <a:solidFill>
@@ -3890,7 +3880,7 @@
                 </a:solidFill>
               </a:rPr>
               <a:pPr/>
-              <a:t>2/3/2016</a:t>
+              <a:t>2/3/16</a:t>
             </a:fld>
             <a:endParaRPr lang="en-US">
               <a:solidFill>
@@ -4394,7 +4384,7 @@
                 </a:solidFill>
               </a:rPr>
               <a:pPr/>
-              <a:t>2/3/2016</a:t>
+              <a:t>2/3/16</a:t>
             </a:fld>
             <a:endParaRPr lang="en-US">
               <a:solidFill>
@@ -4489,7 +4479,7 @@
           <a:p>
             <a:r>
               <a:rPr lang="en-US" dirty="0" smtClean="0"/>
-              <a:t>Problem</a:t>
+              <a:t>Summary</a:t>
             </a:r>
             <a:endParaRPr lang="en-US" dirty="0"/>
           </a:p>
@@ -4608,7 +4598,7 @@
                 </a:solidFill>
               </a:rPr>
               <a:pPr/>
-              <a:t>2/3/2016</a:t>
+              <a:t>2/3/16</a:t>
             </a:fld>
             <a:endParaRPr lang="en-US">
               <a:solidFill>
@@ -4821,7 +4811,7 @@
                 </a:solidFill>
               </a:rPr>
               <a:pPr/>
-              <a:t>2/3/2016</a:t>
+              <a:t>2/3/16</a:t>
             </a:fld>
             <a:endParaRPr lang="en-US">
               <a:solidFill>
@@ -4976,6 +4966,10 @@
           <a:bodyPr/>
           <a:lstStyle/>
           <a:p>
+            <a:r>
+              <a:rPr lang="en-US" smtClean="0"/>
+              <a:t>Results</a:t>
+            </a:r>
             <a:endParaRPr lang="en-US"/>
           </a:p>
         </p:txBody>
@@ -5002,7 +4996,7 @@
                 </a:solidFill>
               </a:rPr>
               <a:pPr/>
-              <a:t>2/3/2016</a:t>
+              <a:t>2/3/16</a:t>
             </a:fld>
             <a:endParaRPr lang="en-US">
               <a:solidFill>
@@ -5186,7 +5180,7 @@
                 </a:solidFill>
               </a:rPr>
               <a:pPr/>
-              <a:t>2/3/2016</a:t>
+              <a:t>2/3/16</a:t>
             </a:fld>
             <a:endParaRPr lang="en-US">
               <a:solidFill>
@@ -5390,7 +5384,7 @@
                 </a:solidFill>
               </a:rPr>
               <a:pPr/>
-              <a:t>2/3/2016</a:t>
+              <a:t>2/3/16</a:t>
             </a:fld>
             <a:endParaRPr lang="en-US">
               <a:solidFill>

</xml_diff>